<commit_message>
clarified distinction between ridge and least squares regression
</commit_message>
<xml_diff>
--- a/lecture_slides/10_Loss and Regularization.pptx
+++ b/lecture_slides/10_Loss and Regularization.pptx
@@ -218,7 +218,7 @@
           <a:p>
             <a:fld id="{5FAD3E5C-F930-41FF-A7BD-4F17EC525029}" type="datetimeFigureOut">
               <a:rPr lang="en-US" smtClean="0"/>
-              <a:t>1/27/2020</a:t>
+              <a:t>2/4/2020</a:t>
             </a:fld>
             <a:endParaRPr lang="en-US"/>
           </a:p>
@@ -692,7 +692,7 @@
           <a:p>
             <a:fld id="{CF755E22-BC43-4D49-9578-DDCD8AECFE11}" type="datetime1">
               <a:rPr lang="en-US" smtClean="0"/>
-              <a:t>1/27/2020</a:t>
+              <a:t>2/4/2020</a:t>
             </a:fld>
             <a:endParaRPr lang="en-US"/>
           </a:p>
@@ -885,7 +885,7 @@
           <a:p>
             <a:fld id="{0794BCA7-61FF-4C69-83B4-1EE7F9C38FAE}" type="datetime1">
               <a:rPr lang="en-US" smtClean="0"/>
-              <a:t>1/27/2020</a:t>
+              <a:t>2/4/2020</a:t>
             </a:fld>
             <a:endParaRPr lang="en-US"/>
           </a:p>
@@ -1065,7 +1065,7 @@
           <a:p>
             <a:fld id="{2F426122-0BE0-446C-A2FF-4796182DFFAC}" type="datetime1">
               <a:rPr lang="en-US" smtClean="0"/>
-              <a:t>1/27/2020</a:t>
+              <a:t>2/4/2020</a:t>
             </a:fld>
             <a:endParaRPr lang="en-US"/>
           </a:p>
@@ -1247,7 +1247,7 @@
           <a:p>
             <a:fld id="{04327D2D-9EC0-4F31-85D2-F4C48BAC2F55}" type="datetime1">
               <a:rPr lang="en-US" smtClean="0"/>
-              <a:t>1/27/2020</a:t>
+              <a:t>2/4/2020</a:t>
             </a:fld>
             <a:endParaRPr lang="en-US"/>
           </a:p>
@@ -1505,7 +1505,7 @@
           <a:p>
             <a:fld id="{384E5460-7712-4DAC-A337-BB4CDDFDE11E}" type="datetime1">
               <a:rPr lang="en-US" smtClean="0"/>
-              <a:t>1/27/2020</a:t>
+              <a:t>2/4/2020</a:t>
             </a:fld>
             <a:endParaRPr lang="en-US"/>
           </a:p>
@@ -1853,7 +1853,7 @@
           <a:p>
             <a:fld id="{B6D96965-36E5-4BBA-B60B-6A05499492A8}" type="datetime1">
               <a:rPr lang="en-US" smtClean="0"/>
-              <a:t>1/27/2020</a:t>
+              <a:t>2/4/2020</a:t>
             </a:fld>
             <a:endParaRPr lang="en-US"/>
           </a:p>
@@ -2297,7 +2297,7 @@
           <a:p>
             <a:fld id="{E5FF4975-A1F7-4E83-8D89-D5C6A414E393}" type="datetime1">
               <a:rPr lang="en-US" smtClean="0"/>
-              <a:t>1/27/2020</a:t>
+              <a:t>2/4/2020</a:t>
             </a:fld>
             <a:endParaRPr lang="en-US"/>
           </a:p>
@@ -2415,7 +2415,7 @@
           <a:p>
             <a:fld id="{A743C323-1D9C-4347-AB6E-A56B8A43D30E}" type="datetime1">
               <a:rPr lang="en-US" smtClean="0"/>
-              <a:t>1/27/2020</a:t>
+              <a:t>2/4/2020</a:t>
             </a:fld>
             <a:endParaRPr lang="en-US"/>
           </a:p>
@@ -2510,7 +2510,7 @@
           <a:p>
             <a:fld id="{14A699DA-48FF-4F63-A1AD-D752E11C195D}" type="datetime1">
               <a:rPr lang="en-US" smtClean="0"/>
-              <a:t>1/27/2020</a:t>
+              <a:t>2/4/2020</a:t>
             </a:fld>
             <a:endParaRPr lang="en-US"/>
           </a:p>
@@ -2869,7 +2869,7 @@
           <a:p>
             <a:fld id="{13DBFBEF-2B7E-4BA9-A9F8-30DFE087F6D3}" type="datetime1">
               <a:rPr lang="en-US" smtClean="0"/>
-              <a:t>1/27/2020</a:t>
+              <a:t>2/4/2020</a:t>
             </a:fld>
             <a:endParaRPr lang="en-US"/>
           </a:p>
@@ -3185,7 +3185,7 @@
           <a:p>
             <a:fld id="{2CBB7AE7-2826-4915-A6AD-CDE2CB158F62}" type="datetime1">
               <a:rPr lang="en-US" smtClean="0"/>
-              <a:t>1/27/2020</a:t>
+              <a:t>2/4/2020</a:t>
             </a:fld>
             <a:endParaRPr lang="en-US"/>
           </a:p>
@@ -3418,7 +3418,7 @@
           <a:p>
             <a:fld id="{B8DB072C-F5A4-4FFF-AAE2-73A8228D61CF}" type="datetime1">
               <a:rPr lang="en-US" smtClean="0"/>
-              <a:t>1/27/2020</a:t>
+              <a:t>2/4/2020</a:t>
             </a:fld>
             <a:endParaRPr lang="en-US"/>
           </a:p>
@@ -8236,7 +8236,7 @@
           <a:p>
             <a:r>
               <a:rPr lang="en-IN" dirty="0" smtClean="0"/>
-              <a:t>Least Squares Regression</a:t>
+              <a:t>Ridge Regression</a:t>
             </a:r>
             <a:endParaRPr lang="en-IN" dirty="0"/>
           </a:p>
@@ -9415,7 +9415,7 @@
         </p:blipFill>
         <p:spPr>
           <a:xfrm>
-            <a:off x="10471107" y="251177"/>
+            <a:off x="10471107" y="1368215"/>
             <a:ext cx="1720892" cy="1720892"/>
           </a:xfrm>
           <a:prstGeom prst="rect">
@@ -9423,8 +9423,8 @@
           </a:prstGeom>
         </p:spPr>
       </p:pic>
-      <mc:AlternateContent xmlns:mc="http://schemas.openxmlformats.org/markup-compatibility/2006" xmlns:a14="http://schemas.microsoft.com/office/drawing/2010/main">
-        <mc:Choice Requires="a14">
+      <mc:AlternateContent xmlns:mc="http://schemas.openxmlformats.org/markup-compatibility/2006">
+        <mc:Choice xmlns:a14="http://schemas.microsoft.com/office/drawing/2010/main" Requires="a14">
           <p:sp>
             <p:nvSpPr>
               <p:cNvPr id="6" name="Rectangular Callout 5"/>
@@ -9433,13 +9433,13 @@
             </p:nvSpPr>
             <p:spPr>
               <a:xfrm>
-                <a:off x="1130157" y="304086"/>
+                <a:off x="1238311" y="1421124"/>
                 <a:ext cx="9232796" cy="1041829"/>
               </a:xfrm>
               <a:prstGeom prst="wedgeRectCallout">
                 <a:avLst>
-                  <a:gd name="adj1" fmla="val 59674"/>
-                  <a:gd name="adj2" fmla="val 57304"/>
+                  <a:gd name="adj1" fmla="val 58077"/>
+                  <a:gd name="adj2" fmla="val 55417"/>
                 </a:avLst>
               </a:prstGeom>
               <a:solidFill>
@@ -9956,7 +9956,7 @@
             </p:txBody>
           </p:sp>
         </mc:Choice>
-        <mc:Fallback xmlns="">
+        <mc:Fallback>
           <p:sp>
             <p:nvSpPr>
               <p:cNvPr id="6" name="Rectangular Callout 5"/>
@@ -9967,19 +9967,19 @@
             </p:nvSpPr>
             <p:spPr>
               <a:xfrm>
-                <a:off x="1130157" y="304086"/>
+                <a:off x="1238311" y="1421124"/>
                 <a:ext cx="9232796" cy="1041829"/>
               </a:xfrm>
               <a:prstGeom prst="wedgeRectCallout">
                 <a:avLst>
-                  <a:gd name="adj1" fmla="val 59674"/>
-                  <a:gd name="adj2" fmla="val 57304"/>
+                  <a:gd name="adj1" fmla="val 58077"/>
+                  <a:gd name="adj2" fmla="val 55417"/>
                 </a:avLst>
               </a:prstGeom>
               <a:blipFill>
                 <a:blip r:embed="rId4"/>
                 <a:stretch>
-                  <a:fillRect l="-719" b="-4211"/>
+                  <a:fillRect l="-730" b="-5882"/>
                 </a:stretch>
               </a:blipFill>
               <a:ln w="38100">
@@ -10025,7 +10025,7 @@
         </p:blipFill>
         <p:spPr>
           <a:xfrm flipH="1">
-            <a:off x="10404212" y="2083894"/>
+            <a:off x="10404212" y="3179972"/>
             <a:ext cx="1787788" cy="1787788"/>
           </a:xfrm>
           <a:prstGeom prst="rect">
@@ -10041,13 +10041,13 @@
         </p:nvSpPr>
         <p:spPr>
           <a:xfrm>
-            <a:off x="1130158" y="2032290"/>
+            <a:off x="1238311" y="3227342"/>
             <a:ext cx="9232796" cy="1100586"/>
           </a:xfrm>
           <a:prstGeom prst="wedgeRectCallout">
             <a:avLst>
-              <a:gd name="adj1" fmla="val 56777"/>
-              <a:gd name="adj2" fmla="val 51275"/>
+              <a:gd name="adj1" fmla="val 56458"/>
+              <a:gd name="adj2" fmla="val 53955"/>
             </a:avLst>
           </a:prstGeom>
           <a:solidFill>
@@ -10156,7 +10156,7 @@
         </p:blipFill>
         <p:spPr>
           <a:xfrm>
-            <a:off x="10404857" y="4053543"/>
+            <a:off x="10404857" y="5036492"/>
             <a:ext cx="1787143" cy="1787143"/>
           </a:xfrm>
           <a:prstGeom prst="rect">
@@ -10172,7 +10172,7 @@
         </p:nvSpPr>
         <p:spPr>
           <a:xfrm>
-            <a:off x="1130158" y="3984812"/>
+            <a:off x="1238311" y="5058625"/>
             <a:ext cx="9232796" cy="1100586"/>
           </a:xfrm>
           <a:prstGeom prst="wedgeRectCallout">
@@ -10265,6 +10265,649 @@
           </a:p>
         </p:txBody>
       </p:sp>
+      <p:grpSp>
+        <p:nvGrpSpPr>
+          <p:cNvPr id="11" name="Group 10"/>
+          <p:cNvGrpSpPr/>
+          <p:nvPr/>
+        </p:nvGrpSpPr>
+        <p:grpSpPr>
+          <a:xfrm>
+            <a:off x="10621576" y="49961"/>
+            <a:ext cx="1468606" cy="1238929"/>
+            <a:chOff x="12383748" y="1219011"/>
+            <a:chExt cx="1862104" cy="1570887"/>
+          </a:xfrm>
+        </p:grpSpPr>
+        <p:sp>
+          <p:nvSpPr>
+            <p:cNvPr id="12" name="Freeform 11"/>
+            <p:cNvSpPr/>
+            <p:nvPr/>
+          </p:nvSpPr>
+          <p:spPr>
+            <a:xfrm>
+              <a:off x="12383748" y="1219011"/>
+              <a:ext cx="1862104" cy="1570887"/>
+            </a:xfrm>
+            <a:custGeom>
+              <a:avLst/>
+              <a:gdLst>
+                <a:gd name="connsiteX0" fmla="*/ 720726 w 1441452"/>
+                <a:gd name="connsiteY0" fmla="*/ 0 h 1216022"/>
+                <a:gd name="connsiteX1" fmla="*/ 1437731 w 1441452"/>
+                <a:gd name="connsiteY1" fmla="*/ 718294 h 1216022"/>
+                <a:gd name="connsiteX2" fmla="*/ 1441452 w 1441452"/>
+                <a:gd name="connsiteY2" fmla="*/ 800098 h 1216022"/>
+                <a:gd name="connsiteX3" fmla="*/ 1426809 w 1441452"/>
+                <a:gd name="connsiteY3" fmla="*/ 883920 h 1216022"/>
+                <a:gd name="connsiteX4" fmla="*/ 720726 w 1441452"/>
+                <a:gd name="connsiteY4" fmla="*/ 1216022 h 1216022"/>
+                <a:gd name="connsiteX5" fmla="*/ 14643 w 1441452"/>
+                <a:gd name="connsiteY5" fmla="*/ 883920 h 1216022"/>
+                <a:gd name="connsiteX6" fmla="*/ 0 w 1441452"/>
+                <a:gd name="connsiteY6" fmla="*/ 800098 h 1216022"/>
+                <a:gd name="connsiteX7" fmla="*/ 3721 w 1441452"/>
+                <a:gd name="connsiteY7" fmla="*/ 718294 h 1216022"/>
+                <a:gd name="connsiteX8" fmla="*/ 720726 w 1441452"/>
+                <a:gd name="connsiteY8" fmla="*/ 0 h 1216022"/>
+              </a:gdLst>
+              <a:ahLst/>
+              <a:cxnLst>
+                <a:cxn ang="0">
+                  <a:pos x="connsiteX0" y="connsiteY0"/>
+                </a:cxn>
+                <a:cxn ang="0">
+                  <a:pos x="connsiteX1" y="connsiteY1"/>
+                </a:cxn>
+                <a:cxn ang="0">
+                  <a:pos x="connsiteX2" y="connsiteY2"/>
+                </a:cxn>
+                <a:cxn ang="0">
+                  <a:pos x="connsiteX3" y="connsiteY3"/>
+                </a:cxn>
+                <a:cxn ang="0">
+                  <a:pos x="connsiteX4" y="connsiteY4"/>
+                </a:cxn>
+                <a:cxn ang="0">
+                  <a:pos x="connsiteX5" y="connsiteY5"/>
+                </a:cxn>
+                <a:cxn ang="0">
+                  <a:pos x="connsiteX6" y="connsiteY6"/>
+                </a:cxn>
+                <a:cxn ang="0">
+                  <a:pos x="connsiteX7" y="connsiteY7"/>
+                </a:cxn>
+                <a:cxn ang="0">
+                  <a:pos x="connsiteX8" y="connsiteY8"/>
+                </a:cxn>
+              </a:cxnLst>
+              <a:rect l="l" t="t" r="r" b="b"/>
+              <a:pathLst>
+                <a:path w="1441452" h="1216022">
+                  <a:moveTo>
+                    <a:pt x="720726" y="0"/>
+                  </a:moveTo>
+                  <a:cubicBezTo>
+                    <a:pt x="1093894" y="0"/>
+                    <a:pt x="1400823" y="314839"/>
+                    <a:pt x="1437731" y="718294"/>
+                  </a:cubicBezTo>
+                  <a:lnTo>
+                    <a:pt x="1441452" y="800098"/>
+                  </a:lnTo>
+                  <a:lnTo>
+                    <a:pt x="1426809" y="883920"/>
+                  </a:lnTo>
+                  <a:cubicBezTo>
+                    <a:pt x="1359604" y="1073450"/>
+                    <a:pt x="1069016" y="1216022"/>
+                    <a:pt x="720726" y="1216022"/>
+                  </a:cubicBezTo>
+                  <a:cubicBezTo>
+                    <a:pt x="372436" y="1216022"/>
+                    <a:pt x="81848" y="1073450"/>
+                    <a:pt x="14643" y="883920"/>
+                  </a:cubicBezTo>
+                  <a:lnTo>
+                    <a:pt x="0" y="800098"/>
+                  </a:lnTo>
+                  <a:lnTo>
+                    <a:pt x="3721" y="718294"/>
+                  </a:lnTo>
+                  <a:cubicBezTo>
+                    <a:pt x="40630" y="314839"/>
+                    <a:pt x="347558" y="0"/>
+                    <a:pt x="720726" y="0"/>
+                  </a:cubicBezTo>
+                  <a:close/>
+                </a:path>
+              </a:pathLst>
+            </a:custGeom>
+            <a:solidFill>
+              <a:schemeClr val="bg1">
+                <a:lumMod val="95000"/>
+              </a:schemeClr>
+            </a:solidFill>
+            <a:ln>
+              <a:noFill/>
+            </a:ln>
+          </p:spPr>
+          <p:style>
+            <a:lnRef idx="2">
+              <a:schemeClr val="accent1">
+                <a:shade val="50000"/>
+              </a:schemeClr>
+            </a:lnRef>
+            <a:fillRef idx="1">
+              <a:schemeClr val="accent1"/>
+            </a:fillRef>
+            <a:effectRef idx="0">
+              <a:schemeClr val="accent1"/>
+            </a:effectRef>
+            <a:fontRef idx="minor">
+              <a:schemeClr val="lt1"/>
+            </a:fontRef>
+          </p:style>
+          <p:txBody>
+            <a:bodyPr rtlCol="0" anchor="ctr"/>
+            <a:lstStyle/>
+            <a:p>
+              <a:pPr algn="ctr"/>
+              <a:endParaRPr lang="en-IN"/>
+            </a:p>
+          </p:txBody>
+        </p:sp>
+        <p:sp>
+          <p:nvSpPr>
+            <p:cNvPr id="13" name="Freeform 12"/>
+            <p:cNvSpPr/>
+            <p:nvPr/>
+          </p:nvSpPr>
+          <p:spPr>
+            <a:xfrm rot="10800000">
+              <a:off x="12542947" y="1611492"/>
+              <a:ext cx="1543705" cy="969673"/>
+            </a:xfrm>
+            <a:custGeom>
+              <a:avLst/>
+              <a:gdLst>
+                <a:gd name="connsiteX0" fmla="*/ 597490 w 1194980"/>
+                <a:gd name="connsiteY0" fmla="*/ 0 h 750623"/>
+                <a:gd name="connsiteX1" fmla="*/ 1194980 w 1194980"/>
+                <a:gd name="connsiteY1" fmla="*/ 278342 h 750623"/>
+                <a:gd name="connsiteX2" fmla="*/ 597490 w 1194980"/>
+                <a:gd name="connsiteY2" fmla="*/ 750623 h 750623"/>
+                <a:gd name="connsiteX3" fmla="*/ 0 w 1194980"/>
+                <a:gd name="connsiteY3" fmla="*/ 278342 h 750623"/>
+                <a:gd name="connsiteX4" fmla="*/ 597490 w 1194980"/>
+                <a:gd name="connsiteY4" fmla="*/ 0 h 750623"/>
+              </a:gdLst>
+              <a:ahLst/>
+              <a:cxnLst>
+                <a:cxn ang="0">
+                  <a:pos x="connsiteX0" y="connsiteY0"/>
+                </a:cxn>
+                <a:cxn ang="0">
+                  <a:pos x="connsiteX1" y="connsiteY1"/>
+                </a:cxn>
+                <a:cxn ang="0">
+                  <a:pos x="connsiteX2" y="connsiteY2"/>
+                </a:cxn>
+                <a:cxn ang="0">
+                  <a:pos x="connsiteX3" y="connsiteY3"/>
+                </a:cxn>
+                <a:cxn ang="0">
+                  <a:pos x="connsiteX4" y="connsiteY4"/>
+                </a:cxn>
+              </a:cxnLst>
+              <a:rect l="l" t="t" r="r" b="b"/>
+              <a:pathLst>
+                <a:path w="1194980" h="750623">
+                  <a:moveTo>
+                    <a:pt x="597490" y="0"/>
+                  </a:moveTo>
+                  <a:cubicBezTo>
+                    <a:pt x="927475" y="0"/>
+                    <a:pt x="1194980" y="124618"/>
+                    <a:pt x="1194980" y="278342"/>
+                  </a:cubicBezTo>
+                  <a:cubicBezTo>
+                    <a:pt x="1194980" y="539176"/>
+                    <a:pt x="927475" y="750623"/>
+                    <a:pt x="597490" y="750623"/>
+                  </a:cubicBezTo>
+                  <a:cubicBezTo>
+                    <a:pt x="267505" y="750623"/>
+                    <a:pt x="0" y="539176"/>
+                    <a:pt x="0" y="278342"/>
+                  </a:cubicBezTo>
+                  <a:cubicBezTo>
+                    <a:pt x="0" y="124618"/>
+                    <a:pt x="267505" y="0"/>
+                    <a:pt x="597490" y="0"/>
+                  </a:cubicBezTo>
+                  <a:close/>
+                </a:path>
+              </a:pathLst>
+            </a:custGeom>
+            <a:solidFill>
+              <a:schemeClr val="tx1">
+                <a:lumMod val="75000"/>
+                <a:lumOff val="25000"/>
+              </a:schemeClr>
+            </a:solidFill>
+            <a:ln>
+              <a:noFill/>
+            </a:ln>
+          </p:spPr>
+          <p:style>
+            <a:lnRef idx="2">
+              <a:schemeClr val="accent1">
+                <a:shade val="50000"/>
+              </a:schemeClr>
+            </a:lnRef>
+            <a:fillRef idx="1">
+              <a:schemeClr val="accent1"/>
+            </a:fillRef>
+            <a:effectRef idx="0">
+              <a:schemeClr val="accent1"/>
+            </a:effectRef>
+            <a:fontRef idx="minor">
+              <a:schemeClr val="lt1"/>
+            </a:fontRef>
+          </p:style>
+          <p:txBody>
+            <a:bodyPr rtlCol="0" anchor="ctr"/>
+            <a:lstStyle/>
+            <a:p>
+              <a:pPr algn="ctr"/>
+              <a:endParaRPr lang="en-IN"/>
+            </a:p>
+          </p:txBody>
+        </p:sp>
+        <p:sp>
+          <p:nvSpPr>
+            <p:cNvPr id="14" name="Freeform 13"/>
+            <p:cNvSpPr/>
+            <p:nvPr/>
+          </p:nvSpPr>
+          <p:spPr>
+            <a:xfrm>
+              <a:off x="13314800" y="1219011"/>
+              <a:ext cx="931052" cy="1570887"/>
+            </a:xfrm>
+            <a:custGeom>
+              <a:avLst/>
+              <a:gdLst>
+                <a:gd name="connsiteX0" fmla="*/ 0 w 720726"/>
+                <a:gd name="connsiteY0" fmla="*/ 0 h 1216022"/>
+                <a:gd name="connsiteX1" fmla="*/ 717005 w 720726"/>
+                <a:gd name="connsiteY1" fmla="*/ 718294 h 1216022"/>
+                <a:gd name="connsiteX2" fmla="*/ 720726 w 720726"/>
+                <a:gd name="connsiteY2" fmla="*/ 800098 h 1216022"/>
+                <a:gd name="connsiteX3" fmla="*/ 706083 w 720726"/>
+                <a:gd name="connsiteY3" fmla="*/ 883920 h 1216022"/>
+                <a:gd name="connsiteX4" fmla="*/ 0 w 720726"/>
+                <a:gd name="connsiteY4" fmla="*/ 1216022 h 1216022"/>
+              </a:gdLst>
+              <a:ahLst/>
+              <a:cxnLst>
+                <a:cxn ang="0">
+                  <a:pos x="connsiteX0" y="connsiteY0"/>
+                </a:cxn>
+                <a:cxn ang="0">
+                  <a:pos x="connsiteX1" y="connsiteY1"/>
+                </a:cxn>
+                <a:cxn ang="0">
+                  <a:pos x="connsiteX2" y="connsiteY2"/>
+                </a:cxn>
+                <a:cxn ang="0">
+                  <a:pos x="connsiteX3" y="connsiteY3"/>
+                </a:cxn>
+                <a:cxn ang="0">
+                  <a:pos x="connsiteX4" y="connsiteY4"/>
+                </a:cxn>
+              </a:cxnLst>
+              <a:rect l="l" t="t" r="r" b="b"/>
+              <a:pathLst>
+                <a:path w="720726" h="1216022">
+                  <a:moveTo>
+                    <a:pt x="0" y="0"/>
+                  </a:moveTo>
+                  <a:cubicBezTo>
+                    <a:pt x="373168" y="0"/>
+                    <a:pt x="680097" y="314839"/>
+                    <a:pt x="717005" y="718294"/>
+                  </a:cubicBezTo>
+                  <a:lnTo>
+                    <a:pt x="720726" y="800098"/>
+                  </a:lnTo>
+                  <a:lnTo>
+                    <a:pt x="706083" y="883920"/>
+                  </a:lnTo>
+                  <a:cubicBezTo>
+                    <a:pt x="638878" y="1073450"/>
+                    <a:pt x="348290" y="1216022"/>
+                    <a:pt x="0" y="1216022"/>
+                  </a:cubicBezTo>
+                  <a:close/>
+                </a:path>
+              </a:pathLst>
+            </a:custGeom>
+            <a:solidFill>
+              <a:schemeClr val="tx1">
+                <a:alpha val="5000"/>
+              </a:schemeClr>
+            </a:solidFill>
+            <a:ln>
+              <a:noFill/>
+            </a:ln>
+          </p:spPr>
+          <p:style>
+            <a:lnRef idx="2">
+              <a:schemeClr val="accent1">
+                <a:shade val="50000"/>
+              </a:schemeClr>
+            </a:lnRef>
+            <a:fillRef idx="1">
+              <a:schemeClr val="accent1"/>
+            </a:fillRef>
+            <a:effectRef idx="0">
+              <a:schemeClr val="accent1"/>
+            </a:effectRef>
+            <a:fontRef idx="minor">
+              <a:schemeClr val="lt1"/>
+            </a:fontRef>
+          </p:style>
+          <p:txBody>
+            <a:bodyPr rtlCol="0" anchor="ctr"/>
+            <a:lstStyle/>
+            <a:p>
+              <a:pPr algn="ctr"/>
+              <a:endParaRPr lang="en-IN"/>
+            </a:p>
+          </p:txBody>
+        </p:sp>
+        <p:sp>
+          <p:nvSpPr>
+            <p:cNvPr id="15" name="Oval 14"/>
+            <p:cNvSpPr/>
+            <p:nvPr/>
+          </p:nvSpPr>
+          <p:spPr>
+            <a:xfrm rot="1665767">
+              <a:off x="12772445" y="2008188"/>
+              <a:ext cx="462622" cy="333492"/>
+            </a:xfrm>
+            <a:prstGeom prst="ellipse">
+              <a:avLst/>
+            </a:prstGeom>
+            <a:pattFill prst="dkHorz">
+              <a:fgClr>
+                <a:schemeClr val="tx1"/>
+              </a:fgClr>
+              <a:bgClr>
+                <a:schemeClr val="accent3">
+                  <a:lumMod val="75000"/>
+                </a:schemeClr>
+              </a:bgClr>
+            </a:pattFill>
+            <a:ln>
+              <a:noFill/>
+            </a:ln>
+          </p:spPr>
+          <p:style>
+            <a:lnRef idx="2">
+              <a:schemeClr val="accent1">
+                <a:shade val="50000"/>
+              </a:schemeClr>
+            </a:lnRef>
+            <a:fillRef idx="1">
+              <a:schemeClr val="accent1"/>
+            </a:fillRef>
+            <a:effectRef idx="0">
+              <a:schemeClr val="accent1"/>
+            </a:effectRef>
+            <a:fontRef idx="minor">
+              <a:schemeClr val="lt1"/>
+            </a:fontRef>
+          </p:style>
+          <p:txBody>
+            <a:bodyPr rtlCol="0" anchor="ctr"/>
+            <a:lstStyle/>
+            <a:p>
+              <a:pPr algn="ctr"/>
+              <a:endParaRPr lang="en-IN"/>
+            </a:p>
+          </p:txBody>
+        </p:sp>
+        <p:sp>
+          <p:nvSpPr>
+            <p:cNvPr id="16" name="Oval 15"/>
+            <p:cNvSpPr/>
+            <p:nvPr/>
+          </p:nvSpPr>
+          <p:spPr>
+            <a:xfrm rot="19934233" flipV="1">
+              <a:off x="13397236" y="2008187"/>
+              <a:ext cx="462622" cy="333492"/>
+            </a:xfrm>
+            <a:prstGeom prst="ellipse">
+              <a:avLst/>
+            </a:prstGeom>
+            <a:pattFill prst="dkHorz">
+              <a:fgClr>
+                <a:schemeClr val="tx1"/>
+              </a:fgClr>
+              <a:bgClr>
+                <a:schemeClr val="accent3">
+                  <a:lumMod val="75000"/>
+                </a:schemeClr>
+              </a:bgClr>
+            </a:pattFill>
+            <a:ln>
+              <a:noFill/>
+            </a:ln>
+          </p:spPr>
+          <p:style>
+            <a:lnRef idx="2">
+              <a:schemeClr val="accent1">
+                <a:shade val="50000"/>
+              </a:schemeClr>
+            </a:lnRef>
+            <a:fillRef idx="1">
+              <a:schemeClr val="accent1"/>
+            </a:fillRef>
+            <a:effectRef idx="0">
+              <a:schemeClr val="accent1"/>
+            </a:effectRef>
+            <a:fontRef idx="minor">
+              <a:schemeClr val="lt1"/>
+            </a:fontRef>
+          </p:style>
+          <p:txBody>
+            <a:bodyPr rtlCol="0" anchor="ctr"/>
+            <a:lstStyle/>
+            <a:p>
+              <a:pPr algn="ctr"/>
+              <a:endParaRPr lang="en-IN"/>
+            </a:p>
+          </p:txBody>
+        </p:sp>
+      </p:grpSp>
+      <mc:AlternateContent xmlns:mc="http://schemas.openxmlformats.org/markup-compatibility/2006">
+        <mc:Choice xmlns:a14="http://schemas.microsoft.com/office/drawing/2010/main" Requires="a14">
+          <p:sp>
+            <p:nvSpPr>
+              <p:cNvPr id="17" name="Rectangular Callout 16"/>
+              <p:cNvSpPr/>
+              <p:nvPr/>
+            </p:nvSpPr>
+            <p:spPr>
+              <a:xfrm>
+                <a:off x="597192" y="226205"/>
+                <a:ext cx="9873915" cy="992260"/>
+              </a:xfrm>
+              <a:prstGeom prst="wedgeRectCallout">
+                <a:avLst>
+                  <a:gd name="adj1" fmla="val 58090"/>
+                  <a:gd name="adj2" fmla="val 49874"/>
+                </a:avLst>
+              </a:prstGeom>
+              <a:solidFill>
+                <a:schemeClr val="bg1"/>
+              </a:solidFill>
+              <a:ln w="38100">
+                <a:solidFill>
+                  <a:schemeClr val="accent1"/>
+                </a:solidFill>
+              </a:ln>
+            </p:spPr>
+            <p:style>
+              <a:lnRef idx="2">
+                <a:schemeClr val="accent1">
+                  <a:shade val="50000"/>
+                </a:schemeClr>
+              </a:lnRef>
+              <a:fillRef idx="1">
+                <a:schemeClr val="accent1"/>
+              </a:fillRef>
+              <a:effectRef idx="0">
+                <a:schemeClr val="accent1"/>
+              </a:effectRef>
+              <a:fontRef idx="minor">
+                <a:schemeClr val="lt1"/>
+              </a:fontRef>
+            </p:style>
+            <p:txBody>
+              <a:bodyPr rtlCol="0" anchor="ctr"/>
+              <a:lstStyle/>
+              <a:p>
+                <a:pPr algn="ctr"/>
+                <a:r>
+                  <a:rPr lang="en-US" sz="2400" dirty="0" smtClean="0">
+                    <a:solidFill>
+                      <a:schemeClr val="tx1"/>
+                    </a:solidFill>
+                    <a:latin typeface="+mj-lt"/>
+                  </a:rPr>
+                  <a:t>Ridge regression uses least squares loss and </a:t>
+                </a:r>
+                <a14:m>
+                  <m:oMath xmlns:m="http://schemas.openxmlformats.org/officeDocument/2006/math">
+                    <m:sSub>
+                      <m:sSubPr>
+                        <m:ctrlPr>
+                          <a:rPr lang="en-IN" sz="2400" b="0" i="1" smtClean="0">
+                            <a:solidFill>
+                              <a:schemeClr val="tx1"/>
+                            </a:solidFill>
+                            <a:latin typeface="Cambria Math" panose="02040503050406030204" pitchFamily="18" charset="0"/>
+                          </a:rPr>
+                        </m:ctrlPr>
+                      </m:sSubPr>
+                      <m:e>
+                        <m:r>
+                          <a:rPr lang="en-IN" sz="2400" b="0" i="1" smtClean="0">
+                            <a:solidFill>
+                              <a:schemeClr val="tx1"/>
+                            </a:solidFill>
+                            <a:latin typeface="Cambria Math" panose="02040503050406030204" pitchFamily="18" charset="0"/>
+                          </a:rPr>
+                          <m:t>𝐿</m:t>
+                        </m:r>
+                      </m:e>
+                      <m:sub>
+                        <m:r>
+                          <a:rPr lang="en-IN" sz="2400" b="0" i="1" smtClean="0">
+                            <a:solidFill>
+                              <a:schemeClr val="tx1"/>
+                            </a:solidFill>
+                            <a:latin typeface="Cambria Math" panose="02040503050406030204" pitchFamily="18" charset="0"/>
+                          </a:rPr>
+                          <m:t>2</m:t>
+                        </m:r>
+                      </m:sub>
+                    </m:sSub>
+                  </m:oMath>
+                </a14:m>
+                <a:r>
+                  <a:rPr lang="en-US" sz="2400" dirty="0" smtClean="0">
+                    <a:solidFill>
+                      <a:schemeClr val="tx1"/>
+                    </a:solidFill>
+                    <a:latin typeface="+mj-lt"/>
+                  </a:rPr>
+                  <a:t> regularization. However the term “least squares regression” is often used to refer to ridge regression </a:t>
+                </a:r>
+                <a:r>
+                  <a:rPr lang="en-US" sz="2400" dirty="0" smtClean="0">
+                    <a:solidFill>
+                      <a:schemeClr val="tx1"/>
+                    </a:solidFill>
+                    <a:latin typeface="+mj-lt"/>
+                    <a:sym typeface="Wingdings" panose="05000000000000000000" pitchFamily="2" charset="2"/>
+                  </a:rPr>
+                  <a:t></a:t>
+                </a:r>
+                <a:endParaRPr lang="en-US" sz="2400" dirty="0">
+                  <a:solidFill>
+                    <a:schemeClr val="tx1"/>
+                  </a:solidFill>
+                  <a:latin typeface="+mj-lt"/>
+                </a:endParaRPr>
+              </a:p>
+            </p:txBody>
+          </p:sp>
+        </mc:Choice>
+        <mc:Fallback>
+          <p:sp>
+            <p:nvSpPr>
+              <p:cNvPr id="17" name="Rectangular Callout 16"/>
+              <p:cNvSpPr>
+                <a:spLocks noRot="1" noChangeAspect="1" noMove="1" noResize="1" noEditPoints="1" noAdjustHandles="1" noChangeArrowheads="1" noChangeShapeType="1" noTextEdit="1"/>
+              </p:cNvSpPr>
+              <p:nvPr/>
+            </p:nvSpPr>
+            <p:spPr>
+              <a:xfrm>
+                <a:off x="597192" y="226205"/>
+                <a:ext cx="9873915" cy="992260"/>
+              </a:xfrm>
+              <a:prstGeom prst="wedgeRectCallout">
+                <a:avLst>
+                  <a:gd name="adj1" fmla="val 58090"/>
+                  <a:gd name="adj2" fmla="val 49874"/>
+                </a:avLst>
+              </a:prstGeom>
+              <a:blipFill>
+                <a:blip r:embed="rId7"/>
+                <a:stretch>
+                  <a:fillRect b="-3550"/>
+                </a:stretch>
+              </a:blipFill>
+              <a:ln w="38100">
+                <a:solidFill>
+                  <a:schemeClr val="accent1"/>
+                </a:solidFill>
+              </a:ln>
+            </p:spPr>
+            <p:txBody>
+              <a:bodyPr/>
+              <a:lstStyle/>
+              <a:p>
+                <a:r>
+                  <a:rPr lang="en-IN">
+                    <a:noFill/>
+                  </a:rPr>
+                  <a:t> </a:t>
+                </a:r>
+              </a:p>
+            </p:txBody>
+          </p:sp>
+        </mc:Fallback>
+      </mc:AlternateContent>
     </p:spTree>
     <p:extLst>
       <p:ext uri="{BB962C8B-B14F-4D97-AF65-F5344CB8AC3E}">
@@ -10991,6 +11634,95 @@
                       </p:childTnLst>
                     </p:cTn>
                   </p:par>
+                  <p:par>
+                    <p:cTn id="63" fill="hold">
+                      <p:stCondLst>
+                        <p:cond delay="indefinite"/>
+                      </p:stCondLst>
+                      <p:childTnLst>
+                        <p:par>
+                          <p:cTn id="64" fill="hold">
+                            <p:stCondLst>
+                              <p:cond delay="0"/>
+                            </p:stCondLst>
+                            <p:childTnLst>
+                              <p:par>
+                                <p:cTn id="65" presetID="1" presetClass="entr" presetSubtype="0" fill="hold" nodeType="clickEffect">
+                                  <p:stCondLst>
+                                    <p:cond delay="0"/>
+                                  </p:stCondLst>
+                                  <p:childTnLst>
+                                    <p:set>
+                                      <p:cBhvr>
+                                        <p:cTn id="66" dur="1" fill="hold">
+                                          <p:stCondLst>
+                                            <p:cond delay="0"/>
+                                          </p:stCondLst>
+                                        </p:cTn>
+                                        <p:tgtEl>
+                                          <p:spTgt spid="11"/>
+                                        </p:tgtEl>
+                                        <p:attrNameLst>
+                                          <p:attrName>style.visibility</p:attrName>
+                                        </p:attrNameLst>
+                                      </p:cBhvr>
+                                      <p:to>
+                                        <p:strVal val="visible"/>
+                                      </p:to>
+                                    </p:set>
+                                  </p:childTnLst>
+                                </p:cTn>
+                              </p:par>
+                            </p:childTnLst>
+                          </p:cTn>
+                        </p:par>
+                        <p:par>
+                          <p:cTn id="67" fill="hold">
+                            <p:stCondLst>
+                              <p:cond delay="0"/>
+                            </p:stCondLst>
+                            <p:childTnLst>
+                              <p:par>
+                                <p:cTn id="68" presetID="22" presetClass="entr" presetSubtype="2" fill="hold" grpId="0" nodeType="afterEffect">
+                                  <p:stCondLst>
+                                    <p:cond delay="0"/>
+                                  </p:stCondLst>
+                                  <p:childTnLst>
+                                    <p:set>
+                                      <p:cBhvr>
+                                        <p:cTn id="69" dur="1" fill="hold">
+                                          <p:stCondLst>
+                                            <p:cond delay="0"/>
+                                          </p:stCondLst>
+                                        </p:cTn>
+                                        <p:tgtEl>
+                                          <p:spTgt spid="17"/>
+                                        </p:tgtEl>
+                                        <p:attrNameLst>
+                                          <p:attrName>style.visibility</p:attrName>
+                                        </p:attrNameLst>
+                                      </p:cBhvr>
+                                      <p:to>
+                                        <p:strVal val="visible"/>
+                                      </p:to>
+                                    </p:set>
+                                    <p:animEffect transition="in" filter="wipe(right)">
+                                      <p:cBhvr>
+                                        <p:cTn id="70" dur="500"/>
+                                        <p:tgtEl>
+                                          <p:spTgt spid="17"/>
+                                        </p:tgtEl>
+                                      </p:cBhvr>
+                                    </p:animEffect>
+                                  </p:childTnLst>
+                                </p:cTn>
+                              </p:par>
+                            </p:childTnLst>
+                          </p:cTn>
+                        </p:par>
+                      </p:childTnLst>
+                    </p:cTn>
+                  </p:par>
                 </p:childTnLst>
               </p:cTn>
               <p:prevCondLst>
@@ -11017,6 +11749,7 @@
       <p:bldP spid="6" grpId="0" animBg="1"/>
       <p:bldP spid="8" grpId="0" animBg="1"/>
       <p:bldP spid="10" grpId="0" animBg="1"/>
+      <p:bldP spid="17" grpId="0" animBg="1"/>
     </p:bldLst>
   </p:timing>
 </p:sld>
@@ -11051,12 +11784,26 @@
         </p:nvSpPr>
         <p:spPr/>
         <p:txBody>
-          <a:bodyPr/>
+          <a:bodyPr>
+            <a:normAutofit/>
+          </a:bodyPr>
           <a:lstStyle/>
           <a:p>
             <a:r>
               <a:rPr lang="en-IN" dirty="0" smtClean="0"/>
-              <a:t>Behind the scenes in GD for Least Squares</a:t>
+              <a:t>Behind the </a:t>
+            </a:r>
+            <a:r>
+              <a:rPr lang="en-IN" dirty="0" smtClean="0"/>
+              <a:t>scenes: GD </a:t>
+            </a:r>
+            <a:r>
+              <a:rPr lang="en-IN" dirty="0" smtClean="0"/>
+              <a:t>for </a:t>
+            </a:r>
+            <a:r>
+              <a:rPr lang="en-IN" dirty="0" smtClean="0"/>
+              <a:t>Ridge Regression</a:t>
             </a:r>
             <a:endParaRPr lang="en-IN" dirty="0"/>
           </a:p>
@@ -14060,7 +14807,7 @@
         </p:nvGrpSpPr>
         <p:grpSpPr>
           <a:xfrm>
-            <a:off x="10611301" y="163796"/>
+            <a:off x="10611301" y="942063"/>
             <a:ext cx="1468606" cy="1238929"/>
             <a:chOff x="12383748" y="1219011"/>
             <a:chExt cx="1862104" cy="1570887"/>
@@ -14531,7 +15278,7 @@
         </p:nvSpPr>
         <p:spPr>
           <a:xfrm>
-            <a:off x="4582274" y="339362"/>
+            <a:off x="4582274" y="1117629"/>
             <a:ext cx="5973508" cy="1283954"/>
           </a:xfrm>
           <a:prstGeom prst="wedgeRectCallout">
@@ -21506,8 +22253,8 @@
           </a:p>
         </p:txBody>
       </p:sp>
-      <mc:AlternateContent xmlns:mc="http://schemas.openxmlformats.org/markup-compatibility/2006" xmlns:a14="http://schemas.microsoft.com/office/drawing/2010/main">
-        <mc:Choice Requires="a14">
+      <mc:AlternateContent xmlns:mc="http://schemas.openxmlformats.org/markup-compatibility/2006">
+        <mc:Choice xmlns:a14="http://schemas.microsoft.com/office/drawing/2010/main" Requires="a14">
           <p:sp>
             <p:nvSpPr>
               <p:cNvPr id="3" name="Content Placeholder 2"/>
@@ -21518,9 +22265,16 @@
                 <p:ph idx="1"/>
               </p:nvPr>
             </p:nvSpPr>
-            <p:spPr/>
+            <p:spPr>
+              <a:xfrm>
+                <a:off x="253354" y="1111624"/>
+                <a:ext cx="11600328" cy="5505486"/>
+              </a:xfrm>
+            </p:spPr>
             <p:txBody>
-              <a:bodyPr/>
+              <a:bodyPr>
+                <a:normAutofit/>
+              </a:bodyPr>
               <a:lstStyle/>
               <a:p>
                 <a:r>
@@ -21542,15 +22296,59 @@
               </a:p>
               <a:p>
                 <a:r>
+                  <a:rPr lang="en-IN" b="1" dirty="0" smtClean="0"/>
+                  <a:t>Related methods</a:t>
+                </a:r>
+                <a:r>
                   <a:rPr lang="en-IN" dirty="0" smtClean="0"/>
-                  <a:t>Related methods: learn not from entire data, but a subset of the data</a:t>
+                  <a:t>:</a:t>
+                </a:r>
+                <a:endParaRPr lang="en-IN" dirty="0" smtClean="0"/>
+              </a:p>
+              <a:p>
+                <a:pPr lvl="2"/>
+                <a:r>
+                  <a:rPr lang="en-IN" dirty="0" smtClean="0"/>
+                  <a:t>Learn from not </a:t>
+                </a:r>
+                <a:r>
+                  <a:rPr lang="en-IN" dirty="0"/>
+                  <a:t>entire data, but a subset of the data </a:t>
+                </a:r>
+                <a:r>
+                  <a:rPr lang="en-IN" dirty="0" smtClean="0"/>
+                  <a:t>that seems clean</a:t>
                 </a:r>
               </a:p>
               <a:p>
                 <a:pPr lvl="2"/>
                 <a:r>
                   <a:rPr lang="en-IN" dirty="0" smtClean="0"/>
-                  <a:t>Of the </a:t>
+                  <a:t>Use a corruption-aware loss function like </a:t>
+                </a:r>
+                <a:r>
+                  <a:rPr lang="en-IN" dirty="0"/>
+                  <a:t>the Huber </a:t>
+                </a:r>
+                <a:r>
+                  <a:rPr lang="en-IN" dirty="0" smtClean="0"/>
+                  <a:t>loss in robust </a:t>
+                </a:r>
+                <a:r>
+                  <a:rPr lang="en-IN" dirty="0"/>
+                  <a:t>regression</a:t>
+                </a:r>
+                <a:endParaRPr lang="en-IN" dirty="0" smtClean="0"/>
+              </a:p>
+              <a:p>
+                <a:pPr lvl="2"/>
+                <a:r>
+                  <a:rPr lang="en-IN" dirty="0" smtClean="0"/>
+                  <a:t>Of </a:t>
+                </a:r>
+                <a:r>
+                  <a:rPr lang="en-IN" dirty="0" smtClean="0"/>
+                  <a:t>the </a:t>
                 </a:r>
                 <a14:m>
                   <m:oMath xmlns:m="http://schemas.openxmlformats.org/officeDocument/2006/math">
@@ -21568,7 +22366,7 @@
                 </a:r>
               </a:p>
               <a:p>
-                <a:pPr lvl="2"/>
+                <a:pPr lvl="3"/>
                 <a:r>
                   <a:rPr lang="en-IN" dirty="0" smtClean="0"/>
                   <a:t>Called </a:t>
@@ -21579,49 +22377,18 @@
                 </a:r>
                 <a:r>
                   <a:rPr lang="en-IN" dirty="0" smtClean="0"/>
-                  <a:t>: e.g. LASSO does sparse recovery for least squares</a:t>
-                </a:r>
-              </a:p>
-              <a:p>
-                <a:pPr lvl="2"/>
-                <a:r>
-                  <a:rPr lang="en-IN" dirty="0" smtClean="0"/>
-                  <a:t>Of the </a:t>
-                </a:r>
-                <a14:m>
-                  <m:oMath xmlns:m="http://schemas.openxmlformats.org/officeDocument/2006/math">
-                    <m:r>
-                      <a:rPr lang="en-IN" b="0" i="1" smtClean="0">
-                        <a:latin typeface="Cambria Math" panose="02040503050406030204" pitchFamily="18" charset="0"/>
-                      </a:rPr>
-                      <m:t>𝑛</m:t>
-                    </m:r>
-                  </m:oMath>
-                </a14:m>
-                <a:r>
-                  <a:rPr lang="en-IN" dirty="0" smtClean="0"/>
-                  <a:t> data points, choose only those data points which look clean</a:t>
-                </a:r>
-              </a:p>
-              <a:p>
-                <a:pPr lvl="2"/>
-                <a:r>
-                  <a:rPr lang="en-IN" dirty="0" smtClean="0"/>
-                  <a:t>Called </a:t>
-                </a:r>
-                <a:r>
-                  <a:rPr lang="en-IN" b="1" dirty="0" smtClean="0"/>
-                  <a:t>robust learning</a:t>
+                  <a:t>: e.g. LASSO does sparse recovery for least </a:t>
                 </a:r>
                 <a:r>
                   <a:rPr lang="en-IN" dirty="0" smtClean="0"/>
-                  <a:t>: e.g. Huber loss used for robust regression</a:t>
+                  <a:t>squares loss function</a:t>
                 </a:r>
+                <a:endParaRPr lang="en-IN" dirty="0" smtClean="0"/>
               </a:p>
             </p:txBody>
           </p:sp>
         </mc:Choice>
-        <mc:Fallback xmlns="">
+        <mc:Fallback>
           <p:sp>
             <p:nvSpPr>
               <p:cNvPr id="3" name="Content Placeholder 2"/>
@@ -21633,10 +22400,14 @@
               </p:nvPr>
             </p:nvSpPr>
             <p:spPr>
+              <a:xfrm>
+                <a:off x="253354" y="1111624"/>
+                <a:ext cx="11600328" cy="5505486"/>
+              </a:xfrm>
               <a:blipFill>
                 <a:blip r:embed="rId2"/>
                 <a:stretch>
-                  <a:fillRect l="-578" t="-2759" r="-1944" b="-2184"/>
+                  <a:fillRect l="-578" t="-2658" r="-1944"/>
                 </a:stretch>
               </a:blipFill>
             </p:spPr>

</xml_diff>